<commit_message>
Ppt helyesírási hiba javítás
</commit_message>
<xml_diff>
--- a/BemutatóCsókaAndrás.pptx
+++ b/BemutatóCsókaAndrás.pptx
@@ -251,7 +251,7 @@
           <a:p>
             <a:fld id="{D4491327-AE6A-4889-B705-44534CF58E21}" type="datetimeFigureOut">
               <a:rPr lang="hu-HU" smtClean="0"/>
-              <a:t>2022. 09. 19.</a:t>
+              <a:t>2022. 09. 21.</a:t>
             </a:fld>
             <a:endParaRPr lang="hu-HU"/>
           </a:p>
@@ -309,13 +309,13 @@
   <p:clrMapOvr>
     <a:masterClrMapping/>
   </p:clrMapOvr>
-  <mc:AlternateContent xmlns:mc="http://schemas.openxmlformats.org/markup-compatibility/2006">
-    <mc:Choice xmlns:p159="http://schemas.microsoft.com/office/powerpoint/2015/09/main" Requires="p159">
+  <mc:AlternateContent xmlns:mc="http://schemas.openxmlformats.org/markup-compatibility/2006" xmlns:p159="http://schemas.microsoft.com/office/powerpoint/2015/09/main">
+    <mc:Choice Requires="p159">
       <p:transition xmlns:p14="http://schemas.microsoft.com/office/powerpoint/2010/main" spd="slow" p14:dur="2000">
         <p159:morph option="byObject"/>
       </p:transition>
     </mc:Choice>
-    <mc:Fallback>
+    <mc:Fallback xmlns="">
       <p:transition spd="slow">
         <p:fade/>
       </p:transition>
@@ -431,7 +431,7 @@
           <a:p>
             <a:fld id="{D4491327-AE6A-4889-B705-44534CF58E21}" type="datetimeFigureOut">
               <a:rPr lang="hu-HU" smtClean="0"/>
-              <a:t>2022. 09. 19.</a:t>
+              <a:t>2022. 09. 21.</a:t>
             </a:fld>
             <a:endParaRPr lang="hu-HU"/>
           </a:p>
@@ -489,13 +489,13 @@
   <p:clrMapOvr>
     <a:masterClrMapping/>
   </p:clrMapOvr>
-  <mc:AlternateContent xmlns:mc="http://schemas.openxmlformats.org/markup-compatibility/2006">
-    <mc:Choice xmlns:p159="http://schemas.microsoft.com/office/powerpoint/2015/09/main" Requires="p159">
+  <mc:AlternateContent xmlns:mc="http://schemas.openxmlformats.org/markup-compatibility/2006" xmlns:p159="http://schemas.microsoft.com/office/powerpoint/2015/09/main">
+    <mc:Choice Requires="p159">
       <p:transition xmlns:p14="http://schemas.microsoft.com/office/powerpoint/2010/main" spd="slow" p14:dur="2000">
         <p159:morph option="byObject"/>
       </p:transition>
     </mc:Choice>
-    <mc:Fallback>
+    <mc:Fallback xmlns="">
       <p:transition spd="slow">
         <p:fade/>
       </p:transition>
@@ -621,7 +621,7 @@
           <a:p>
             <a:fld id="{D4491327-AE6A-4889-B705-44534CF58E21}" type="datetimeFigureOut">
               <a:rPr lang="hu-HU" smtClean="0"/>
-              <a:t>2022. 09. 19.</a:t>
+              <a:t>2022. 09. 21.</a:t>
             </a:fld>
             <a:endParaRPr lang="hu-HU"/>
           </a:p>
@@ -679,13 +679,13 @@
   <p:clrMapOvr>
     <a:masterClrMapping/>
   </p:clrMapOvr>
-  <mc:AlternateContent xmlns:mc="http://schemas.openxmlformats.org/markup-compatibility/2006">
-    <mc:Choice xmlns:p159="http://schemas.microsoft.com/office/powerpoint/2015/09/main" Requires="p159">
+  <mc:AlternateContent xmlns:mc="http://schemas.openxmlformats.org/markup-compatibility/2006" xmlns:p159="http://schemas.microsoft.com/office/powerpoint/2015/09/main">
+    <mc:Choice Requires="p159">
       <p:transition xmlns:p14="http://schemas.microsoft.com/office/powerpoint/2010/main" spd="slow" p14:dur="2000">
         <p159:morph option="byObject"/>
       </p:transition>
     </mc:Choice>
-    <mc:Fallback>
+    <mc:Fallback xmlns="">
       <p:transition spd="slow">
         <p:fade/>
       </p:transition>
@@ -801,7 +801,7 @@
           <a:p>
             <a:fld id="{D4491327-AE6A-4889-B705-44534CF58E21}" type="datetimeFigureOut">
               <a:rPr lang="hu-HU" smtClean="0"/>
-              <a:t>2022. 09. 19.</a:t>
+              <a:t>2022. 09. 21.</a:t>
             </a:fld>
             <a:endParaRPr lang="hu-HU"/>
           </a:p>
@@ -859,13 +859,13 @@
   <p:clrMapOvr>
     <a:masterClrMapping/>
   </p:clrMapOvr>
-  <mc:AlternateContent xmlns:mc="http://schemas.openxmlformats.org/markup-compatibility/2006">
-    <mc:Choice xmlns:p159="http://schemas.microsoft.com/office/powerpoint/2015/09/main" Requires="p159">
+  <mc:AlternateContent xmlns:mc="http://schemas.openxmlformats.org/markup-compatibility/2006" xmlns:p159="http://schemas.microsoft.com/office/powerpoint/2015/09/main">
+    <mc:Choice Requires="p159">
       <p:transition xmlns:p14="http://schemas.microsoft.com/office/powerpoint/2010/main" spd="slow" p14:dur="2000">
         <p159:morph option="byObject"/>
       </p:transition>
     </mc:Choice>
-    <mc:Fallback>
+    <mc:Fallback xmlns="">
       <p:transition spd="slow">
         <p:fade/>
       </p:transition>
@@ -1058,7 +1058,7 @@
           <a:p>
             <a:fld id="{D4491327-AE6A-4889-B705-44534CF58E21}" type="datetimeFigureOut">
               <a:rPr lang="hu-HU" smtClean="0"/>
-              <a:t>2022. 09. 19.</a:t>
+              <a:t>2022. 09. 21.</a:t>
             </a:fld>
             <a:endParaRPr lang="hu-HU"/>
           </a:p>
@@ -1116,13 +1116,13 @@
   <p:clrMapOvr>
     <a:masterClrMapping/>
   </p:clrMapOvr>
-  <mc:AlternateContent xmlns:mc="http://schemas.openxmlformats.org/markup-compatibility/2006">
-    <mc:Choice xmlns:p159="http://schemas.microsoft.com/office/powerpoint/2015/09/main" Requires="p159">
+  <mc:AlternateContent xmlns:mc="http://schemas.openxmlformats.org/markup-compatibility/2006" xmlns:p159="http://schemas.microsoft.com/office/powerpoint/2015/09/main">
+    <mc:Choice Requires="p159">
       <p:transition xmlns:p14="http://schemas.microsoft.com/office/powerpoint/2010/main" spd="slow" p14:dur="2000">
         <p159:morph option="byObject"/>
       </p:transition>
     </mc:Choice>
-    <mc:Fallback>
+    <mc:Fallback xmlns="">
       <p:transition spd="slow">
         <p:fade/>
       </p:transition>
@@ -1299,7 +1299,7 @@
           <a:p>
             <a:fld id="{D4491327-AE6A-4889-B705-44534CF58E21}" type="datetimeFigureOut">
               <a:rPr lang="hu-HU" smtClean="0"/>
-              <a:t>2022. 09. 19.</a:t>
+              <a:t>2022. 09. 21.</a:t>
             </a:fld>
             <a:endParaRPr lang="hu-HU"/>
           </a:p>
@@ -1357,13 +1357,13 @@
   <p:clrMapOvr>
     <a:masterClrMapping/>
   </p:clrMapOvr>
-  <mc:AlternateContent xmlns:mc="http://schemas.openxmlformats.org/markup-compatibility/2006">
-    <mc:Choice xmlns:p159="http://schemas.microsoft.com/office/powerpoint/2015/09/main" Requires="p159">
+  <mc:AlternateContent xmlns:mc="http://schemas.openxmlformats.org/markup-compatibility/2006" xmlns:p159="http://schemas.microsoft.com/office/powerpoint/2015/09/main">
+    <mc:Choice Requires="p159">
       <p:transition xmlns:p14="http://schemas.microsoft.com/office/powerpoint/2010/main" spd="slow" p14:dur="2000">
         <p159:morph option="byObject"/>
       </p:transition>
     </mc:Choice>
-    <mc:Fallback>
+    <mc:Fallback xmlns="">
       <p:transition spd="slow">
         <p:fade/>
       </p:transition>
@@ -1675,7 +1675,7 @@
           <a:p>
             <a:fld id="{D4491327-AE6A-4889-B705-44534CF58E21}" type="datetimeFigureOut">
               <a:rPr lang="hu-HU" smtClean="0"/>
-              <a:t>2022. 09. 19.</a:t>
+              <a:t>2022. 09. 21.</a:t>
             </a:fld>
             <a:endParaRPr lang="hu-HU"/>
           </a:p>
@@ -1733,13 +1733,13 @@
   <p:clrMapOvr>
     <a:masterClrMapping/>
   </p:clrMapOvr>
-  <mc:AlternateContent xmlns:mc="http://schemas.openxmlformats.org/markup-compatibility/2006">
-    <mc:Choice xmlns:p159="http://schemas.microsoft.com/office/powerpoint/2015/09/main" Requires="p159">
+  <mc:AlternateContent xmlns:mc="http://schemas.openxmlformats.org/markup-compatibility/2006" xmlns:p159="http://schemas.microsoft.com/office/powerpoint/2015/09/main">
+    <mc:Choice Requires="p159">
       <p:transition xmlns:p14="http://schemas.microsoft.com/office/powerpoint/2010/main" spd="slow" p14:dur="2000">
         <p159:morph option="byObject"/>
       </p:transition>
     </mc:Choice>
-    <mc:Fallback>
+    <mc:Fallback xmlns="">
       <p:transition spd="slow">
         <p:fade/>
       </p:transition>
@@ -1804,7 +1804,7 @@
           <a:p>
             <a:fld id="{D4491327-AE6A-4889-B705-44534CF58E21}" type="datetimeFigureOut">
               <a:rPr lang="hu-HU" smtClean="0"/>
-              <a:t>2022. 09. 19.</a:t>
+              <a:t>2022. 09. 21.</a:t>
             </a:fld>
             <a:endParaRPr lang="hu-HU"/>
           </a:p>
@@ -1862,13 +1862,13 @@
   <p:clrMapOvr>
     <a:masterClrMapping/>
   </p:clrMapOvr>
-  <mc:AlternateContent xmlns:mc="http://schemas.openxmlformats.org/markup-compatibility/2006">
-    <mc:Choice xmlns:p159="http://schemas.microsoft.com/office/powerpoint/2015/09/main" Requires="p159">
+  <mc:AlternateContent xmlns:mc="http://schemas.openxmlformats.org/markup-compatibility/2006" xmlns:p159="http://schemas.microsoft.com/office/powerpoint/2015/09/main">
+    <mc:Choice Requires="p159">
       <p:transition xmlns:p14="http://schemas.microsoft.com/office/powerpoint/2010/main" spd="slow" p14:dur="2000">
         <p159:morph option="byObject"/>
       </p:transition>
     </mc:Choice>
-    <mc:Fallback>
+    <mc:Fallback xmlns="">
       <p:transition spd="slow">
         <p:fade/>
       </p:transition>
@@ -1911,7 +1911,7 @@
           <a:p>
             <a:fld id="{D4491327-AE6A-4889-B705-44534CF58E21}" type="datetimeFigureOut">
               <a:rPr lang="hu-HU" smtClean="0"/>
-              <a:t>2022. 09. 19.</a:t>
+              <a:t>2022. 09. 21.</a:t>
             </a:fld>
             <a:endParaRPr lang="hu-HU"/>
           </a:p>
@@ -1969,13 +1969,13 @@
   <p:clrMapOvr>
     <a:masterClrMapping/>
   </p:clrMapOvr>
-  <mc:AlternateContent xmlns:mc="http://schemas.openxmlformats.org/markup-compatibility/2006">
-    <mc:Choice xmlns:p159="http://schemas.microsoft.com/office/powerpoint/2015/09/main" Requires="p159">
+  <mc:AlternateContent xmlns:mc="http://schemas.openxmlformats.org/markup-compatibility/2006" xmlns:p159="http://schemas.microsoft.com/office/powerpoint/2015/09/main">
+    <mc:Choice Requires="p159">
       <p:transition xmlns:p14="http://schemas.microsoft.com/office/powerpoint/2010/main" spd="slow" p14:dur="2000">
         <p159:morph option="byObject"/>
       </p:transition>
     </mc:Choice>
-    <mc:Fallback>
+    <mc:Fallback xmlns="">
       <p:transition spd="slow">
         <p:fade/>
       </p:transition>
@@ -2198,7 +2198,7 @@
           <a:p>
             <a:fld id="{D4491327-AE6A-4889-B705-44534CF58E21}" type="datetimeFigureOut">
               <a:rPr lang="hu-HU" smtClean="0"/>
-              <a:t>2022. 09. 19.</a:t>
+              <a:t>2022. 09. 21.</a:t>
             </a:fld>
             <a:endParaRPr lang="hu-HU"/>
           </a:p>
@@ -2256,13 +2256,13 @@
   <p:clrMapOvr>
     <a:masterClrMapping/>
   </p:clrMapOvr>
-  <mc:AlternateContent xmlns:mc="http://schemas.openxmlformats.org/markup-compatibility/2006">
-    <mc:Choice xmlns:p159="http://schemas.microsoft.com/office/powerpoint/2015/09/main" Requires="p159">
+  <mc:AlternateContent xmlns:mc="http://schemas.openxmlformats.org/markup-compatibility/2006" xmlns:p159="http://schemas.microsoft.com/office/powerpoint/2015/09/main">
+    <mc:Choice Requires="p159">
       <p:transition xmlns:p14="http://schemas.microsoft.com/office/powerpoint/2010/main" spd="slow" p14:dur="2000">
         <p159:morph option="byObject"/>
       </p:transition>
     </mc:Choice>
-    <mc:Fallback>
+    <mc:Fallback xmlns="">
       <p:transition spd="slow">
         <p:fade/>
       </p:transition>
@@ -2462,7 +2462,7 @@
           <a:p>
             <a:fld id="{D4491327-AE6A-4889-B705-44534CF58E21}" type="datetimeFigureOut">
               <a:rPr lang="hu-HU" smtClean="0"/>
-              <a:t>2022. 09. 19.</a:t>
+              <a:t>2022. 09. 21.</a:t>
             </a:fld>
             <a:endParaRPr lang="hu-HU"/>
           </a:p>
@@ -2520,13 +2520,13 @@
   <p:clrMapOvr>
     <a:masterClrMapping/>
   </p:clrMapOvr>
-  <mc:AlternateContent xmlns:mc="http://schemas.openxmlformats.org/markup-compatibility/2006">
-    <mc:Choice xmlns:p159="http://schemas.microsoft.com/office/powerpoint/2015/09/main" Requires="p159">
+  <mc:AlternateContent xmlns:mc="http://schemas.openxmlformats.org/markup-compatibility/2006" xmlns:p159="http://schemas.microsoft.com/office/powerpoint/2015/09/main">
+    <mc:Choice Requires="p159">
       <p:transition xmlns:p14="http://schemas.microsoft.com/office/powerpoint/2010/main" spd="slow" p14:dur="2000">
         <p159:morph option="byObject"/>
       </p:transition>
     </mc:Choice>
-    <mc:Fallback>
+    <mc:Fallback xmlns="">
       <p:transition spd="slow">
         <p:fade/>
       </p:transition>
@@ -2685,7 +2685,7 @@
           <a:p>
             <a:fld id="{D4491327-AE6A-4889-B705-44534CF58E21}" type="datetimeFigureOut">
               <a:rPr lang="hu-HU" smtClean="0"/>
-              <a:t>2022. 09. 19.</a:t>
+              <a:t>2022. 09. 21.</a:t>
             </a:fld>
             <a:endParaRPr lang="hu-HU"/>
           </a:p>
@@ -2790,13 +2790,13 @@
     <p:sldLayoutId id="2147483658" r:id="rId10"/>
     <p:sldLayoutId id="2147483659" r:id="rId11"/>
   </p:sldLayoutIdLst>
-  <mc:AlternateContent xmlns:mc="http://schemas.openxmlformats.org/markup-compatibility/2006">
-    <mc:Choice xmlns:p159="http://schemas.microsoft.com/office/powerpoint/2015/09/main" Requires="p159">
+  <mc:AlternateContent xmlns:mc="http://schemas.openxmlformats.org/markup-compatibility/2006" xmlns:p159="http://schemas.microsoft.com/office/powerpoint/2015/09/main">
+    <mc:Choice Requires="p159">
       <p:transition xmlns:p14="http://schemas.microsoft.com/office/powerpoint/2010/main" spd="slow" p14:dur="2000">
         <p159:morph option="byObject"/>
       </p:transition>
     </mc:Choice>
-    <mc:Fallback>
+    <mc:Fallback xmlns="">
       <p:transition spd="slow">
         <p:fade/>
       </p:transition>
@@ -3856,13 +3856,13 @@
   <p:clrMapOvr>
     <a:overrideClrMapping bg1="dk1" tx1="lt1" bg2="dk2" tx2="lt2" accent1="accent1" accent2="accent2" accent3="accent3" accent4="accent4" accent5="accent5" accent6="accent6" hlink="hlink" folHlink="folHlink"/>
   </p:clrMapOvr>
-  <mc:AlternateContent xmlns:mc="http://schemas.openxmlformats.org/markup-compatibility/2006">
-    <mc:Choice xmlns:p159="http://schemas.microsoft.com/office/powerpoint/2015/09/main" Requires="p159">
+  <mc:AlternateContent xmlns:mc="http://schemas.openxmlformats.org/markup-compatibility/2006" xmlns:p159="http://schemas.microsoft.com/office/powerpoint/2015/09/main">
+    <mc:Choice Requires="p159">
       <p:transition xmlns:p14="http://schemas.microsoft.com/office/powerpoint/2010/main" spd="slow" p14:dur="2000">
         <p159:morph option="byObject"/>
       </p:transition>
     </mc:Choice>
-    <mc:Fallback>
+    <mc:Fallback xmlns="">
       <p:transition spd="slow">
         <p:fade/>
       </p:transition>
@@ -5085,13 +5085,13 @@
   <p:clrMapOvr>
     <a:masterClrMapping/>
   </p:clrMapOvr>
-  <mc:AlternateContent xmlns:mc="http://schemas.openxmlformats.org/markup-compatibility/2006">
-    <mc:Choice xmlns:p159="http://schemas.microsoft.com/office/powerpoint/2015/09/main" Requires="p159">
+  <mc:AlternateContent xmlns:mc="http://schemas.openxmlformats.org/markup-compatibility/2006" xmlns:p159="http://schemas.microsoft.com/office/powerpoint/2015/09/main">
+    <mc:Choice Requires="p159">
       <p:transition xmlns:p14="http://schemas.microsoft.com/office/powerpoint/2010/main" spd="slow" p14:dur="2000">
         <p159:morph option="byObject"/>
       </p:transition>
     </mc:Choice>
-    <mc:Fallback>
+    <mc:Fallback xmlns="">
       <p:transition spd="slow">
         <p:fade/>
       </p:transition>
@@ -5252,13 +5252,13 @@
   <p:clrMapOvr>
     <a:masterClrMapping/>
   </p:clrMapOvr>
-  <mc:AlternateContent xmlns:mc="http://schemas.openxmlformats.org/markup-compatibility/2006">
-    <mc:Choice xmlns:p159="http://schemas.microsoft.com/office/powerpoint/2015/09/main" Requires="p159">
+  <mc:AlternateContent xmlns:mc="http://schemas.openxmlformats.org/markup-compatibility/2006" xmlns:p159="http://schemas.microsoft.com/office/powerpoint/2015/09/main">
+    <mc:Choice Requires="p159">
       <p:transition xmlns:p14="http://schemas.microsoft.com/office/powerpoint/2010/main" spd="slow" p14:dur="2000">
         <p159:morph option="byObject"/>
       </p:transition>
     </mc:Choice>
-    <mc:Fallback>
+    <mc:Fallback xmlns="">
       <p:transition spd="slow">
         <p:fade/>
       </p:transition>
@@ -6043,13 +6043,13 @@
   <p:clrMapOvr>
     <a:masterClrMapping/>
   </p:clrMapOvr>
-  <mc:AlternateContent xmlns:mc="http://schemas.openxmlformats.org/markup-compatibility/2006">
-    <mc:Choice xmlns:p159="http://schemas.microsoft.com/office/powerpoint/2015/09/main" Requires="p159">
+  <mc:AlternateContent xmlns:mc="http://schemas.openxmlformats.org/markup-compatibility/2006" xmlns:p159="http://schemas.microsoft.com/office/powerpoint/2015/09/main">
+    <mc:Choice Requires="p159">
       <p:transition xmlns:p14="http://schemas.microsoft.com/office/powerpoint/2010/main" spd="slow" p14:dur="2000">
         <p159:morph option="byObject"/>
       </p:transition>
     </mc:Choice>
-    <mc:Fallback>
+    <mc:Fallback xmlns="">
       <p:transition spd="slow">
         <p:fade/>
       </p:transition>
@@ -6404,13 +6404,13 @@
   <p:clrMapOvr>
     <a:masterClrMapping/>
   </p:clrMapOvr>
-  <mc:AlternateContent xmlns:mc="http://schemas.openxmlformats.org/markup-compatibility/2006">
-    <mc:Choice xmlns:p159="http://schemas.microsoft.com/office/powerpoint/2015/09/main" Requires="p159">
+  <mc:AlternateContent xmlns:mc="http://schemas.openxmlformats.org/markup-compatibility/2006" xmlns:p159="http://schemas.microsoft.com/office/powerpoint/2015/09/main">
+    <mc:Choice Requires="p159">
       <p:transition xmlns:p14="http://schemas.microsoft.com/office/powerpoint/2010/main" spd="slow" p14:dur="2000">
         <p159:morph option="byObject"/>
       </p:transition>
     </mc:Choice>
-    <mc:Fallback>
+    <mc:Fallback xmlns="">
       <p:transition spd="slow">
         <p:fade/>
       </p:transition>
@@ -6753,13 +6753,13 @@
   <p:clrMapOvr>
     <a:masterClrMapping/>
   </p:clrMapOvr>
-  <mc:AlternateContent xmlns:mc="http://schemas.openxmlformats.org/markup-compatibility/2006">
-    <mc:Choice xmlns:p159="http://schemas.microsoft.com/office/powerpoint/2015/09/main" Requires="p159">
+  <mc:AlternateContent xmlns:mc="http://schemas.openxmlformats.org/markup-compatibility/2006" xmlns:p159="http://schemas.microsoft.com/office/powerpoint/2015/09/main">
+    <mc:Choice Requires="p159">
       <p:transition xmlns:p14="http://schemas.microsoft.com/office/powerpoint/2010/main" spd="slow" p14:dur="2000">
         <p159:morph option="byObject"/>
       </p:transition>
     </mc:Choice>
-    <mc:Fallback>
+    <mc:Fallback xmlns="">
       <p:transition spd="slow">
         <p:fade/>
       </p:transition>
@@ -7127,13 +7127,13 @@
   <p:clrMapOvr>
     <a:masterClrMapping/>
   </p:clrMapOvr>
-  <mc:AlternateContent xmlns:mc="http://schemas.openxmlformats.org/markup-compatibility/2006">
-    <mc:Choice xmlns:p159="http://schemas.microsoft.com/office/powerpoint/2015/09/main" Requires="p159">
+  <mc:AlternateContent xmlns:mc="http://schemas.openxmlformats.org/markup-compatibility/2006" xmlns:p159="http://schemas.microsoft.com/office/powerpoint/2015/09/main">
+    <mc:Choice Requires="p159">
       <p:transition xmlns:p14="http://schemas.microsoft.com/office/powerpoint/2010/main" spd="slow" p14:dur="2000">
         <p159:morph option="byObject"/>
       </p:transition>
     </mc:Choice>
-    <mc:Fallback>
+    <mc:Fallback xmlns="">
       <p:transition spd="slow">
         <p:fade/>
       </p:transition>
@@ -7495,13 +7495,13 @@
   <p:clrMapOvr>
     <a:masterClrMapping/>
   </p:clrMapOvr>
-  <mc:AlternateContent xmlns:mc="http://schemas.openxmlformats.org/markup-compatibility/2006">
-    <mc:Choice xmlns:p159="http://schemas.microsoft.com/office/powerpoint/2015/09/main" Requires="p159">
+  <mc:AlternateContent xmlns:mc="http://schemas.openxmlformats.org/markup-compatibility/2006" xmlns:p159="http://schemas.microsoft.com/office/powerpoint/2015/09/main">
+    <mc:Choice Requires="p159">
       <p:transition xmlns:p14="http://schemas.microsoft.com/office/powerpoint/2010/main" spd="slow" p14:dur="2000">
         <p159:morph option="byObject"/>
       </p:transition>
     </mc:Choice>
-    <mc:Fallback>
+    <mc:Fallback xmlns="">
       <p:transition spd="slow">
         <p:fade/>
       </p:transition>
@@ -7589,7 +7589,7 @@
           <a:p>
             <a:r>
               <a:rPr lang="hu-HU" sz="2000" dirty="0"/>
-              <a:t>Impulzusos lézerfény és fázis alapó</a:t>
+              <a:t>Impulzusos lézerfény és fázis alapú</a:t>
             </a:r>
           </a:p>
           <a:p>
@@ -7619,14 +7619,13 @@
           <a:p>
             <a:r>
               <a:rPr lang="hu-HU" sz="2000" dirty="0"/>
-              <a:t>Érzékeny a tükröződésekre</a:t>
-            </a:r>
-          </a:p>
-          <a:p>
-            <a:r>
-              <a:rPr lang="hu-HU" sz="2000" dirty="0"/>
-              <a:t>Minden számítás pixel szinten történik</a:t>
-            </a:r>
+              <a:t>Érzékeny </a:t>
+            </a:r>
+            <a:r>
+              <a:rPr lang="hu-HU" sz="2000"/>
+              <a:t>a tükröződésekre</a:t>
+            </a:r>
+            <a:endParaRPr lang="hu-HU" sz="2000" dirty="0"/>
           </a:p>
         </p:txBody>
       </p:sp>
@@ -7875,13 +7874,13 @@
   <p:clrMapOvr>
     <a:masterClrMapping/>
   </p:clrMapOvr>
-  <mc:AlternateContent xmlns:mc="http://schemas.openxmlformats.org/markup-compatibility/2006">
-    <mc:Choice xmlns:p159="http://schemas.microsoft.com/office/powerpoint/2015/09/main" Requires="p159">
+  <mc:AlternateContent xmlns:mc="http://schemas.openxmlformats.org/markup-compatibility/2006" xmlns:p159="http://schemas.microsoft.com/office/powerpoint/2015/09/main">
+    <mc:Choice Requires="p159">
       <p:transition xmlns:p14="http://schemas.microsoft.com/office/powerpoint/2010/main" spd="slow" p14:dur="2000">
         <p159:morph option="byObject"/>
       </p:transition>
     </mc:Choice>
-    <mc:Fallback>
+    <mc:Fallback xmlns="">
       <p:transition spd="slow">
         <p:fade/>
       </p:transition>
@@ -8223,13 +8222,13 @@
   <p:clrMapOvr>
     <a:masterClrMapping/>
   </p:clrMapOvr>
-  <mc:AlternateContent xmlns:mc="http://schemas.openxmlformats.org/markup-compatibility/2006">
-    <mc:Choice xmlns:p159="http://schemas.microsoft.com/office/powerpoint/2015/09/main" Requires="p159">
+  <mc:AlternateContent xmlns:mc="http://schemas.openxmlformats.org/markup-compatibility/2006" xmlns:p159="http://schemas.microsoft.com/office/powerpoint/2015/09/main">
+    <mc:Choice Requires="p159">
       <p:transition xmlns:p14="http://schemas.microsoft.com/office/powerpoint/2010/main" spd="slow" p14:dur="2000">
         <p159:morph option="byObject"/>
       </p:transition>
     </mc:Choice>
-    <mc:Fallback>
+    <mc:Fallback xmlns="">
       <p:transition spd="slow">
         <p:fade/>
       </p:transition>
@@ -8966,13 +8965,13 @@
   <p:clrMapOvr>
     <a:masterClrMapping/>
   </p:clrMapOvr>
-  <mc:AlternateContent xmlns:mc="http://schemas.openxmlformats.org/markup-compatibility/2006">
-    <mc:Choice xmlns:p159="http://schemas.microsoft.com/office/powerpoint/2015/09/main" Requires="p159">
+  <mc:AlternateContent xmlns:mc="http://schemas.openxmlformats.org/markup-compatibility/2006" xmlns:p159="http://schemas.microsoft.com/office/powerpoint/2015/09/main">
+    <mc:Choice Requires="p159">
       <p:transition xmlns:p14="http://schemas.microsoft.com/office/powerpoint/2010/main" spd="slow" p14:dur="2000">
         <p159:morph option="byObject"/>
       </p:transition>
     </mc:Choice>
-    <mc:Fallback>
+    <mc:Fallback xmlns="">
       <p:transition spd="slow">
         <p:fade/>
       </p:transition>

</xml_diff>